<commit_message>
heatmap with new family names
</commit_message>
<xml_diff>
--- a/manuscript/figures/heatmap/Presentation1.pptx
+++ b/manuscript/figures/heatmap/Presentation1.pptx
@@ -13,6 +13,7 @@
     <p:sldId id="261" r:id="rId7"/>
     <p:sldId id="262" r:id="rId8"/>
     <p:sldId id="263" r:id="rId9"/>
+    <p:sldId id="264" r:id="rId10"/>
   </p:sldIdLst>
   <p:sldSz cx="12192000" cy="6858000"/>
   <p:notesSz cx="6858000" cy="9144000"/>
@@ -279,7 +280,7 @@
           <a:p>
             <a:fld id="{4C61F7E7-8B6D-044F-BB35-E997950EE35D}" type="datetimeFigureOut">
               <a:rPr lang="en-DK" smtClean="0"/>
-              <a:t>03/05/2023</a:t>
+              <a:t>18/07/2023</a:t>
             </a:fld>
             <a:endParaRPr lang="en-DK"/>
           </a:p>
@@ -479,7 +480,7 @@
           <a:p>
             <a:fld id="{4C61F7E7-8B6D-044F-BB35-E997950EE35D}" type="datetimeFigureOut">
               <a:rPr lang="en-DK" smtClean="0"/>
-              <a:t>03/05/2023</a:t>
+              <a:t>18/07/2023</a:t>
             </a:fld>
             <a:endParaRPr lang="en-DK"/>
           </a:p>
@@ -689,7 +690,7 @@
           <a:p>
             <a:fld id="{4C61F7E7-8B6D-044F-BB35-E997950EE35D}" type="datetimeFigureOut">
               <a:rPr lang="en-DK" smtClean="0"/>
-              <a:t>03/05/2023</a:t>
+              <a:t>18/07/2023</a:t>
             </a:fld>
             <a:endParaRPr lang="en-DK"/>
           </a:p>
@@ -889,7 +890,7 @@
           <a:p>
             <a:fld id="{4C61F7E7-8B6D-044F-BB35-E997950EE35D}" type="datetimeFigureOut">
               <a:rPr lang="en-DK" smtClean="0"/>
-              <a:t>03/05/2023</a:t>
+              <a:t>18/07/2023</a:t>
             </a:fld>
             <a:endParaRPr lang="en-DK"/>
           </a:p>
@@ -1165,7 +1166,7 @@
           <a:p>
             <a:fld id="{4C61F7E7-8B6D-044F-BB35-E997950EE35D}" type="datetimeFigureOut">
               <a:rPr lang="en-DK" smtClean="0"/>
-              <a:t>03/05/2023</a:t>
+              <a:t>18/07/2023</a:t>
             </a:fld>
             <a:endParaRPr lang="en-DK"/>
           </a:p>
@@ -1433,7 +1434,7 @@
           <a:p>
             <a:fld id="{4C61F7E7-8B6D-044F-BB35-E997950EE35D}" type="datetimeFigureOut">
               <a:rPr lang="en-DK" smtClean="0"/>
-              <a:t>03/05/2023</a:t>
+              <a:t>18/07/2023</a:t>
             </a:fld>
             <a:endParaRPr lang="en-DK"/>
           </a:p>
@@ -1848,7 +1849,7 @@
           <a:p>
             <a:fld id="{4C61F7E7-8B6D-044F-BB35-E997950EE35D}" type="datetimeFigureOut">
               <a:rPr lang="en-DK" smtClean="0"/>
-              <a:t>03/05/2023</a:t>
+              <a:t>18/07/2023</a:t>
             </a:fld>
             <a:endParaRPr lang="en-DK"/>
           </a:p>
@@ -1990,7 +1991,7 @@
           <a:p>
             <a:fld id="{4C61F7E7-8B6D-044F-BB35-E997950EE35D}" type="datetimeFigureOut">
               <a:rPr lang="en-DK" smtClean="0"/>
-              <a:t>03/05/2023</a:t>
+              <a:t>18/07/2023</a:t>
             </a:fld>
             <a:endParaRPr lang="en-DK"/>
           </a:p>
@@ -2103,7 +2104,7 @@
           <a:p>
             <a:fld id="{4C61F7E7-8B6D-044F-BB35-E997950EE35D}" type="datetimeFigureOut">
               <a:rPr lang="en-DK" smtClean="0"/>
-              <a:t>03/05/2023</a:t>
+              <a:t>18/07/2023</a:t>
             </a:fld>
             <a:endParaRPr lang="en-DK"/>
           </a:p>
@@ -2416,7 +2417,7 @@
           <a:p>
             <a:fld id="{4C61F7E7-8B6D-044F-BB35-E997950EE35D}" type="datetimeFigureOut">
               <a:rPr lang="en-DK" smtClean="0"/>
-              <a:t>03/05/2023</a:t>
+              <a:t>18/07/2023</a:t>
             </a:fld>
             <a:endParaRPr lang="en-DK"/>
           </a:p>
@@ -2705,7 +2706,7 @@
           <a:p>
             <a:fld id="{4C61F7E7-8B6D-044F-BB35-E997950EE35D}" type="datetimeFigureOut">
               <a:rPr lang="en-DK" smtClean="0"/>
-              <a:t>03/05/2023</a:t>
+              <a:t>18/07/2023</a:t>
             </a:fld>
             <a:endParaRPr lang="en-DK"/>
           </a:p>
@@ -2948,7 +2949,7 @@
           <a:p>
             <a:fld id="{4C61F7E7-8B6D-044F-BB35-E997950EE35D}" type="datetimeFigureOut">
               <a:rPr lang="en-DK" smtClean="0"/>
-              <a:t>03/05/2023</a:t>
+              <a:t>18/07/2023</a:t>
             </a:fld>
             <a:endParaRPr lang="en-DK"/>
           </a:p>
@@ -5594,6 +5595,361 @@
 </p:sld>
 </file>
 
+<file path=ppt/slides/slide9.xml><?xml version="1.0" encoding="utf-8"?>
+<p:sld xmlns:a="http://schemas.openxmlformats.org/drawingml/2006/main" xmlns:r="http://schemas.openxmlformats.org/officeDocument/2006/relationships" xmlns:p="http://schemas.openxmlformats.org/presentationml/2006/main">
+  <p:cSld>
+    <p:spTree>
+      <p:nvGrpSpPr>
+        <p:cNvPr id="1" name=""/>
+        <p:cNvGrpSpPr/>
+        <p:nvPr/>
+      </p:nvGrpSpPr>
+      <p:grpSpPr>
+        <a:xfrm>
+          <a:off x="0" y="0"/>
+          <a:ext cx="0" cy="0"/>
+          <a:chOff x="0" y="0"/>
+          <a:chExt cx="0" cy="0"/>
+        </a:xfrm>
+      </p:grpSpPr>
+      <p:pic>
+        <p:nvPicPr>
+          <p:cNvPr id="4" name="Picture 3">
+            <a:extLst>
+              <a:ext uri="{FF2B5EF4-FFF2-40B4-BE49-F238E27FC236}">
+                <a16:creationId xmlns:a16="http://schemas.microsoft.com/office/drawing/2014/main" id="{A764B0B0-51DA-1CB5-4291-AB17C7E88FE4}"/>
+              </a:ext>
+            </a:extLst>
+          </p:cNvPr>
+          <p:cNvPicPr>
+            <a:picLocks noChangeAspect="1"/>
+          </p:cNvPicPr>
+          <p:nvPr/>
+        </p:nvPicPr>
+        <p:blipFill>
+          <a:blip r:embed="rId2"/>
+          <a:stretch>
+            <a:fillRect/>
+          </a:stretch>
+        </p:blipFill>
+        <p:spPr>
+          <a:xfrm>
+            <a:off x="3298757" y="1139646"/>
+            <a:ext cx="5566616" cy="4643064"/>
+          </a:xfrm>
+          <a:prstGeom prst="rect">
+            <a:avLst/>
+          </a:prstGeom>
+        </p:spPr>
+      </p:pic>
+      <p:cxnSp>
+        <p:nvCxnSpPr>
+          <p:cNvPr id="5" name="Straight Connector 4">
+            <a:extLst>
+              <a:ext uri="{FF2B5EF4-FFF2-40B4-BE49-F238E27FC236}">
+                <a16:creationId xmlns:a16="http://schemas.microsoft.com/office/drawing/2014/main" id="{621BB617-176C-9F1E-B498-A959B4415E06}"/>
+              </a:ext>
+            </a:extLst>
+          </p:cNvPr>
+          <p:cNvCxnSpPr>
+            <a:cxnSpLocks/>
+          </p:cNvCxnSpPr>
+          <p:nvPr/>
+        </p:nvCxnSpPr>
+        <p:spPr>
+          <a:xfrm>
+            <a:off x="4435818" y="3256908"/>
+            <a:ext cx="3624372" cy="0"/>
+          </a:xfrm>
+          <a:prstGeom prst="line">
+            <a:avLst/>
+          </a:prstGeom>
+          <a:ln w="12700">
+            <a:solidFill>
+              <a:schemeClr val="tx1"/>
+            </a:solidFill>
+          </a:ln>
+        </p:spPr>
+        <p:style>
+          <a:lnRef idx="1">
+            <a:schemeClr val="dk1"/>
+          </a:lnRef>
+          <a:fillRef idx="0">
+            <a:schemeClr val="dk1"/>
+          </a:fillRef>
+          <a:effectRef idx="0">
+            <a:schemeClr val="dk1"/>
+          </a:effectRef>
+          <a:fontRef idx="minor">
+            <a:schemeClr val="tx1"/>
+          </a:fontRef>
+        </p:style>
+      </p:cxnSp>
+      <p:cxnSp>
+        <p:nvCxnSpPr>
+          <p:cNvPr id="9" name="Straight Connector 8">
+            <a:extLst>
+              <a:ext uri="{FF2B5EF4-FFF2-40B4-BE49-F238E27FC236}">
+                <a16:creationId xmlns:a16="http://schemas.microsoft.com/office/drawing/2014/main" id="{A698B63C-BEE1-3886-E3D0-5F2C3F3B2335}"/>
+              </a:ext>
+            </a:extLst>
+          </p:cNvPr>
+          <p:cNvCxnSpPr>
+            <a:cxnSpLocks/>
+          </p:cNvCxnSpPr>
+          <p:nvPr/>
+        </p:nvCxnSpPr>
+        <p:spPr>
+          <a:xfrm>
+            <a:off x="4435818" y="2069871"/>
+            <a:ext cx="3624372" cy="0"/>
+          </a:xfrm>
+          <a:prstGeom prst="line">
+            <a:avLst/>
+          </a:prstGeom>
+          <a:ln w="12700">
+            <a:solidFill>
+              <a:schemeClr val="tx1"/>
+            </a:solidFill>
+          </a:ln>
+        </p:spPr>
+        <p:style>
+          <a:lnRef idx="1">
+            <a:schemeClr val="dk1"/>
+          </a:lnRef>
+          <a:fillRef idx="0">
+            <a:schemeClr val="dk1"/>
+          </a:fillRef>
+          <a:effectRef idx="0">
+            <a:schemeClr val="dk1"/>
+          </a:effectRef>
+          <a:fontRef idx="minor">
+            <a:schemeClr val="tx1"/>
+          </a:fontRef>
+        </p:style>
+      </p:cxnSp>
+      <p:cxnSp>
+        <p:nvCxnSpPr>
+          <p:cNvPr id="10" name="Straight Connector 9">
+            <a:extLst>
+              <a:ext uri="{FF2B5EF4-FFF2-40B4-BE49-F238E27FC236}">
+                <a16:creationId xmlns:a16="http://schemas.microsoft.com/office/drawing/2014/main" id="{F0EFFDFD-B4C1-48BE-F5A7-D8A38183A69F}"/>
+              </a:ext>
+            </a:extLst>
+          </p:cNvPr>
+          <p:cNvCxnSpPr>
+            <a:cxnSpLocks/>
+          </p:cNvCxnSpPr>
+          <p:nvPr/>
+        </p:nvCxnSpPr>
+        <p:spPr>
+          <a:xfrm>
+            <a:off x="4435818" y="1473456"/>
+            <a:ext cx="3624372" cy="0"/>
+          </a:xfrm>
+          <a:prstGeom prst="line">
+            <a:avLst/>
+          </a:prstGeom>
+          <a:ln w="12700">
+            <a:solidFill>
+              <a:schemeClr val="tx1"/>
+            </a:solidFill>
+          </a:ln>
+        </p:spPr>
+        <p:style>
+          <a:lnRef idx="1">
+            <a:schemeClr val="dk1"/>
+          </a:lnRef>
+          <a:fillRef idx="0">
+            <a:schemeClr val="dk1"/>
+          </a:fillRef>
+          <a:effectRef idx="0">
+            <a:schemeClr val="dk1"/>
+          </a:effectRef>
+          <a:fontRef idx="minor">
+            <a:schemeClr val="tx1"/>
+          </a:fontRef>
+        </p:style>
+      </p:cxnSp>
+      <p:sp>
+        <p:nvSpPr>
+          <p:cNvPr id="11" name="TextBox 10">
+            <a:extLst>
+              <a:ext uri="{FF2B5EF4-FFF2-40B4-BE49-F238E27FC236}">
+                <a16:creationId xmlns:a16="http://schemas.microsoft.com/office/drawing/2014/main" id="{8A5C9D4F-E24B-2E36-1DC7-8A954A9921A2}"/>
+              </a:ext>
+            </a:extLst>
+          </p:cNvPr>
+          <p:cNvSpPr txBox="1"/>
+          <p:nvPr/>
+        </p:nvSpPr>
+        <p:spPr>
+          <a:xfrm>
+            <a:off x="2463917" y="2109934"/>
+            <a:ext cx="852093" cy="307777"/>
+          </a:xfrm>
+          <a:prstGeom prst="rect">
+            <a:avLst/>
+          </a:prstGeom>
+          <a:noFill/>
+        </p:spPr>
+        <p:txBody>
+          <a:bodyPr wrap="none" rtlCol="0">
+            <a:spAutoFit/>
+          </a:bodyPr>
+          <a:lstStyle/>
+          <a:p>
+            <a:r>
+              <a:rPr lang="en-DK" sz="1400" b="1" dirty="0"/>
+              <a:t>Inverting</a:t>
+            </a:r>
+          </a:p>
+        </p:txBody>
+      </p:sp>
+      <p:sp>
+        <p:nvSpPr>
+          <p:cNvPr id="12" name="TextBox 11">
+            <a:extLst>
+              <a:ext uri="{FF2B5EF4-FFF2-40B4-BE49-F238E27FC236}">
+                <a16:creationId xmlns:a16="http://schemas.microsoft.com/office/drawing/2014/main" id="{DECC7E2B-0400-ECAA-8428-FB845C4BB182}"/>
+              </a:ext>
+            </a:extLst>
+          </p:cNvPr>
+          <p:cNvSpPr txBox="1"/>
+          <p:nvPr/>
+        </p:nvSpPr>
+        <p:spPr>
+          <a:xfrm>
+            <a:off x="2428395" y="3788329"/>
+            <a:ext cx="887615" cy="307777"/>
+          </a:xfrm>
+          <a:prstGeom prst="rect">
+            <a:avLst/>
+          </a:prstGeom>
+          <a:noFill/>
+        </p:spPr>
+        <p:txBody>
+          <a:bodyPr wrap="none" rtlCol="0">
+            <a:spAutoFit/>
+          </a:bodyPr>
+          <a:lstStyle/>
+          <a:p>
+            <a:r>
+              <a:rPr lang="en-DK" sz="1400" b="1" dirty="0"/>
+              <a:t>Retaining</a:t>
+            </a:r>
+          </a:p>
+        </p:txBody>
+      </p:sp>
+      <p:sp>
+        <p:nvSpPr>
+          <p:cNvPr id="13" name="Right Brace 12">
+            <a:extLst>
+              <a:ext uri="{FF2B5EF4-FFF2-40B4-BE49-F238E27FC236}">
+                <a16:creationId xmlns:a16="http://schemas.microsoft.com/office/drawing/2014/main" id="{960674D1-FE22-5911-81DE-71D71C80B520}"/>
+              </a:ext>
+            </a:extLst>
+          </p:cNvPr>
+          <p:cNvSpPr/>
+          <p:nvPr/>
+        </p:nvSpPr>
+        <p:spPr>
+          <a:xfrm rot="10800000">
+            <a:off x="3316011" y="1286943"/>
+            <a:ext cx="133442" cy="1969965"/>
+          </a:xfrm>
+          <a:prstGeom prst="rightBrace">
+            <a:avLst>
+              <a:gd name="adj1" fmla="val 67662"/>
+              <a:gd name="adj2" fmla="val 50000"/>
+            </a:avLst>
+          </a:prstGeom>
+          <a:ln w="9525"/>
+        </p:spPr>
+        <p:style>
+          <a:lnRef idx="1">
+            <a:schemeClr val="dk1"/>
+          </a:lnRef>
+          <a:fillRef idx="0">
+            <a:schemeClr val="dk1"/>
+          </a:fillRef>
+          <a:effectRef idx="0">
+            <a:schemeClr val="dk1"/>
+          </a:effectRef>
+          <a:fontRef idx="minor">
+            <a:schemeClr val="tx1"/>
+          </a:fontRef>
+        </p:style>
+        <p:txBody>
+          <a:bodyPr rtlCol="0" anchor="ctr"/>
+          <a:lstStyle/>
+          <a:p>
+            <a:pPr algn="ctr"/>
+            <a:endParaRPr lang="en-DK"/>
+          </a:p>
+        </p:txBody>
+      </p:sp>
+      <p:sp>
+        <p:nvSpPr>
+          <p:cNvPr id="16" name="Right Brace 15">
+            <a:extLst>
+              <a:ext uri="{FF2B5EF4-FFF2-40B4-BE49-F238E27FC236}">
+                <a16:creationId xmlns:a16="http://schemas.microsoft.com/office/drawing/2014/main" id="{D40D6C2D-62F3-607C-25AF-5F40A52E2055}"/>
+              </a:ext>
+            </a:extLst>
+          </p:cNvPr>
+          <p:cNvSpPr/>
+          <p:nvPr/>
+        </p:nvSpPr>
+        <p:spPr>
+          <a:xfrm rot="10800000">
+            <a:off x="3302688" y="3256908"/>
+            <a:ext cx="133443" cy="1396737"/>
+          </a:xfrm>
+          <a:prstGeom prst="rightBrace">
+            <a:avLst>
+              <a:gd name="adj1" fmla="val 67662"/>
+              <a:gd name="adj2" fmla="val 50000"/>
+            </a:avLst>
+          </a:prstGeom>
+          <a:ln w="9525"/>
+        </p:spPr>
+        <p:style>
+          <a:lnRef idx="1">
+            <a:schemeClr val="dk1"/>
+          </a:lnRef>
+          <a:fillRef idx="0">
+            <a:schemeClr val="dk1"/>
+          </a:fillRef>
+          <a:effectRef idx="0">
+            <a:schemeClr val="dk1"/>
+          </a:effectRef>
+          <a:fontRef idx="minor">
+            <a:schemeClr val="tx1"/>
+          </a:fontRef>
+        </p:style>
+        <p:txBody>
+          <a:bodyPr rtlCol="0" anchor="ctr"/>
+          <a:lstStyle/>
+          <a:p>
+            <a:pPr algn="ctr"/>
+            <a:endParaRPr lang="en-DK"/>
+          </a:p>
+        </p:txBody>
+      </p:sp>
+    </p:spTree>
+    <p:extLst>
+      <p:ext uri="{BB962C8B-B14F-4D97-AF65-F5344CB8AC3E}">
+        <p14:creationId xmlns:p14="http://schemas.microsoft.com/office/powerpoint/2010/main" val="2948621818"/>
+      </p:ext>
+    </p:extLst>
+  </p:cSld>
+  <p:clrMapOvr>
+    <a:masterClrMapping/>
+  </p:clrMapOvr>
+</p:sld>
+</file>
+
 <file path=ppt/theme/theme1.xml><?xml version="1.0" encoding="utf-8"?>
 <a:theme xmlns:a="http://schemas.openxmlformats.org/drawingml/2006/main" name="Office Theme">
   <a:themeElements>

</xml_diff>